<commit_message>
presentazione pdf e pptx
</commit_message>
<xml_diff>
--- a/Presentazione progetto.pptx
+++ b/Presentazione progetto.pptx
@@ -2114,7 +2114,7 @@
               <a:rPr lang="it-IT" sz="900" spc="-20" dirty="0">
                 <a:cs typeface="Arial MT"/>
               </a:rPr>
-              <a:t>creiamo i due nuovi triangoli newT1 e new T2 e li inseriamo nella lista di triangoli;</a:t>
+              <a:t>creiamo i due nuovi triangoli newT1 e new T2 e li inseriamo nelle liste di triangoli;</a:t>
             </a:r>
           </a:p>
           <a:p>
@@ -3360,10 +3360,10 @@
       </p:sp>
       <p:pic>
         <p:nvPicPr>
-          <p:cNvPr id="8" name="Immagine 7" descr="Immagine che contiene origami, Simmetria, modello, arte&#10;&#10;Descrizione generata automaticamente">
+          <p:cNvPr id="4" name="Immagine 3" descr="Immagine che contiene Simmetria, arte, Arti creative, modello&#10;&#10;Descrizione generata automaticamente">
             <a:extLst>
               <a:ext uri="{FF2B5EF4-FFF2-40B4-BE49-F238E27FC236}">
-                <a16:creationId xmlns:a16="http://schemas.microsoft.com/office/drawing/2014/main" id="{DBC4C9A3-16F3-7679-57D6-451FA7F56003}"/>
+                <a16:creationId xmlns:a16="http://schemas.microsoft.com/office/drawing/2014/main" id="{D29330B3-42BD-74BD-A8EB-E8DDBA4A0203}"/>
               </a:ext>
             </a:extLst>
           </p:cNvPr>
@@ -3380,13 +3380,13 @@
               </a:ext>
             </a:extLst>
           </a:blip>
-          <a:srcRect l="24644" t="5981" r="24651" b="7095"/>
+          <a:srcRect l="2187"/>
           <a:stretch/>
         </p:blipFill>
         <p:spPr>
           <a:xfrm>
-            <a:off x="1238249" y="815975"/>
-            <a:ext cx="2133599" cy="2057400"/>
+            <a:off x="52487" y="674410"/>
+            <a:ext cx="4505124" cy="2590800"/>
           </a:xfrm>
           <a:prstGeom prst="rect">
             <a:avLst/>
@@ -3489,6 +3489,42 @@
           </a:p>
         </p:txBody>
       </p:sp>
+      <p:pic>
+        <p:nvPicPr>
+          <p:cNvPr id="8" name="Immagine 7" descr="Immagine che contiene origami, modello, Simmetria, Arti creative&#10;&#10;Descrizione generata automaticamente">
+            <a:extLst>
+              <a:ext uri="{FF2B5EF4-FFF2-40B4-BE49-F238E27FC236}">
+                <a16:creationId xmlns:a16="http://schemas.microsoft.com/office/drawing/2014/main" id="{75679E86-5328-1C95-14E9-D90264572010}"/>
+              </a:ext>
+            </a:extLst>
+          </p:cNvPr>
+          <p:cNvPicPr>
+            <a:picLocks noChangeAspect="1"/>
+          </p:cNvPicPr>
+          <p:nvPr/>
+        </p:nvPicPr>
+        <p:blipFill>
+          <a:blip r:embed="rId2" cstate="print">
+            <a:extLst>
+              <a:ext uri="{28A0092B-C50C-407E-A947-70E740481C1C}">
+                <a14:useLocalDpi xmlns:a14="http://schemas.microsoft.com/office/drawing/2010/main" val="0"/>
+              </a:ext>
+            </a:extLst>
+          </a:blip>
+          <a:stretch>
+            <a:fillRect/>
+          </a:stretch>
+        </p:blipFill>
+        <p:spPr>
+          <a:xfrm>
+            <a:off x="-1" y="690285"/>
+            <a:ext cx="4610100" cy="2593181"/>
+          </a:xfrm>
+          <a:prstGeom prst="rect">
+            <a:avLst/>
+          </a:prstGeom>
+        </p:spPr>
+      </p:pic>
     </p:spTree>
     <p:extLst>
       <p:ext uri="{BB962C8B-B14F-4D97-AF65-F5344CB8AC3E}">
@@ -3585,6 +3621,41 @@
           </a:p>
         </p:txBody>
       </p:sp>
+      <p:pic>
+        <p:nvPicPr>
+          <p:cNvPr id="5" name="Immagine 4" descr="Immagine che contiene modello, arte, Simmetria, disegno&#10;&#10;Descrizione generata automaticamente">
+            <a:extLst>
+              <a:ext uri="{FF2B5EF4-FFF2-40B4-BE49-F238E27FC236}">
+                <a16:creationId xmlns:a16="http://schemas.microsoft.com/office/drawing/2014/main" id="{D68D71CD-778A-A4E7-090B-C20F05F22FB6}"/>
+              </a:ext>
+            </a:extLst>
+          </p:cNvPr>
+          <p:cNvPicPr>
+            <a:picLocks noChangeAspect="1"/>
+          </p:cNvPicPr>
+          <p:nvPr/>
+        </p:nvPicPr>
+        <p:blipFill rotWithShape="1">
+          <a:blip r:embed="rId2" cstate="print">
+            <a:extLst>
+              <a:ext uri="{28A0092B-C50C-407E-A947-70E740481C1C}">
+                <a14:useLocalDpi xmlns:a14="http://schemas.microsoft.com/office/drawing/2010/main" val="0"/>
+              </a:ext>
+            </a:extLst>
+          </a:blip>
+          <a:srcRect l="21901" r="21901"/>
+          <a:stretch/>
+        </p:blipFill>
+        <p:spPr>
+          <a:xfrm>
+            <a:off x="1009649" y="674410"/>
+            <a:ext cx="2590800" cy="2593181"/>
+          </a:xfrm>
+          <a:prstGeom prst="rect">
+            <a:avLst/>
+          </a:prstGeom>
+        </p:spPr>
+      </p:pic>
     </p:spTree>
     <p:extLst>
       <p:ext uri="{BB962C8B-B14F-4D97-AF65-F5344CB8AC3E}">
@@ -3683,10 +3754,10 @@
       </p:sp>
       <p:pic>
         <p:nvPicPr>
-          <p:cNvPr id="4" name="Immagine 3" descr="Immagine che contiene linea, Simmetria, origami, design&#10;&#10;Descrizione generata automaticamente">
+          <p:cNvPr id="6" name="Immagine 5" descr="Immagine che contiene linea, design, modello&#10;&#10;Descrizione generata automaticamente">
             <a:extLst>
               <a:ext uri="{FF2B5EF4-FFF2-40B4-BE49-F238E27FC236}">
-                <a16:creationId xmlns:a16="http://schemas.microsoft.com/office/drawing/2014/main" id="{7DF4B8EC-C37D-7C4F-5687-38CF2F8A2040}"/>
+                <a16:creationId xmlns:a16="http://schemas.microsoft.com/office/drawing/2014/main" id="{03BD0878-3553-35EB-CB57-9B34DFB7C5E9}"/>
               </a:ext>
             </a:extLst>
           </p:cNvPr>
@@ -3703,13 +3774,13 @@
               </a:ext>
             </a:extLst>
           </a:blip>
-          <a:srcRect l="25207" t="5923" r="21900" b="5923"/>
+          <a:srcRect l="6547"/>
           <a:stretch/>
         </p:blipFill>
         <p:spPr>
           <a:xfrm>
-            <a:off x="1193798" y="815975"/>
-            <a:ext cx="2222501" cy="2083595"/>
+            <a:off x="98640" y="674410"/>
+            <a:ext cx="4308258" cy="2593181"/>
           </a:xfrm>
           <a:prstGeom prst="rect">
             <a:avLst/>
@@ -4333,6 +4404,41 @@
           </a:p>
         </p:txBody>
       </p:sp>
+      <p:pic>
+        <p:nvPicPr>
+          <p:cNvPr id="5" name="Immagine 4" descr="Immagine che contiene linea, design, modello&#10;&#10;Descrizione generata automaticamente">
+            <a:extLst>
+              <a:ext uri="{FF2B5EF4-FFF2-40B4-BE49-F238E27FC236}">
+                <a16:creationId xmlns:a16="http://schemas.microsoft.com/office/drawing/2014/main" id="{4E42C6F3-8CCA-9855-0A33-8DCE68369105}"/>
+              </a:ext>
+            </a:extLst>
+          </p:cNvPr>
+          <p:cNvPicPr>
+            <a:picLocks noChangeAspect="1"/>
+          </p:cNvPicPr>
+          <p:nvPr/>
+        </p:nvPicPr>
+        <p:blipFill rotWithShape="1">
+          <a:blip r:embed="rId2" cstate="print">
+            <a:extLst>
+              <a:ext uri="{28A0092B-C50C-407E-A947-70E740481C1C}">
+                <a14:useLocalDpi xmlns:a14="http://schemas.microsoft.com/office/drawing/2010/main" val="0"/>
+              </a:ext>
+            </a:extLst>
+          </a:blip>
+          <a:srcRect l="23554" r="21901"/>
+          <a:stretch/>
+        </p:blipFill>
+        <p:spPr>
+          <a:xfrm>
+            <a:off x="866775" y="645835"/>
+            <a:ext cx="2514600" cy="2593181"/>
+          </a:xfrm>
+          <a:prstGeom prst="rect">
+            <a:avLst/>
+          </a:prstGeom>
+        </p:spPr>
+      </p:pic>
     </p:spTree>
     <p:extLst>
       <p:ext uri="{BB962C8B-B14F-4D97-AF65-F5344CB8AC3E}">
@@ -4429,6 +4535,41 @@
           </a:p>
         </p:txBody>
       </p:sp>
+      <p:pic>
+        <p:nvPicPr>
+          <p:cNvPr id="5" name="Immagine 4" descr="Immagine che contiene linea, design, modello&#10;&#10;Descrizione generata automaticamente">
+            <a:extLst>
+              <a:ext uri="{FF2B5EF4-FFF2-40B4-BE49-F238E27FC236}">
+                <a16:creationId xmlns:a16="http://schemas.microsoft.com/office/drawing/2014/main" id="{FE126566-6C98-D0FC-ADBD-5C9242FF3DFF}"/>
+              </a:ext>
+            </a:extLst>
+          </p:cNvPr>
+          <p:cNvPicPr>
+            <a:picLocks noChangeAspect="1"/>
+          </p:cNvPicPr>
+          <p:nvPr/>
+        </p:nvPicPr>
+        <p:blipFill rotWithShape="1">
+          <a:blip r:embed="rId2" cstate="print">
+            <a:extLst>
+              <a:ext uri="{28A0092B-C50C-407E-A947-70E740481C1C}">
+                <a14:useLocalDpi xmlns:a14="http://schemas.microsoft.com/office/drawing/2010/main" val="0"/>
+              </a:ext>
+            </a:extLst>
+          </a:blip>
+          <a:srcRect l="21901" r="20248"/>
+          <a:stretch/>
+        </p:blipFill>
+        <p:spPr>
+          <a:xfrm>
+            <a:off x="800443" y="674410"/>
+            <a:ext cx="2667000" cy="2593181"/>
+          </a:xfrm>
+          <a:prstGeom prst="rect">
+            <a:avLst/>
+          </a:prstGeom>
+        </p:spPr>
+      </p:pic>
     </p:spTree>
     <p:extLst>
       <p:ext uri="{BB962C8B-B14F-4D97-AF65-F5344CB8AC3E}">
@@ -4576,7 +4717,7 @@
               <a:rPr lang="it-IT" sz="900" spc="-20" dirty="0">
                 <a:cs typeface="Arial MT"/>
               </a:rPr>
-              <a:t>classe Vertex (vertice);</a:t>
+              <a:t>  classe Vertex (vertice);</a:t>
             </a:r>
           </a:p>
           <a:p>
@@ -4600,7 +4741,7 @@
               <a:rPr lang="it-IT" sz="900" spc="-20" dirty="0">
                 <a:cs typeface="Arial MT"/>
               </a:rPr>
-              <a:t>classe Edge (lato);</a:t>
+              <a:t>  classe Edge (lato);</a:t>
             </a:r>
           </a:p>
           <a:p>
@@ -4624,7 +4765,7 @@
               <a:rPr lang="it-IT" sz="900" spc="-20" dirty="0">
                 <a:cs typeface="Arial MT"/>
               </a:rPr>
-              <a:t>classe </a:t>
+              <a:t>  classe </a:t>
             </a:r>
             <a:r>
               <a:rPr lang="it-IT" sz="900" spc="-20" dirty="0" err="1">
@@ -5254,7 +5395,7 @@
         </p:blipFill>
         <p:spPr>
           <a:xfrm>
-            <a:off x="257548" y="587375"/>
+            <a:off x="247650" y="587375"/>
             <a:ext cx="4095004" cy="2405727"/>
           </a:xfrm>
           <a:prstGeom prst="rect">
@@ -5386,10 +5527,10 @@
       </p:sp>
       <p:pic>
         <p:nvPicPr>
-          <p:cNvPr id="5" name="Immagine 4" descr="Immagine che contiene origami, Simmetria, modello, arte&#10;&#10;Descrizione generata automaticamente">
+          <p:cNvPr id="6" name="Immagine 5" descr="Immagine che contiene Simmetria, arte, Arti creative, modello&#10;&#10;Descrizione generata automaticamente">
             <a:extLst>
               <a:ext uri="{FF2B5EF4-FFF2-40B4-BE49-F238E27FC236}">
-                <a16:creationId xmlns:a16="http://schemas.microsoft.com/office/drawing/2014/main" id="{2328B989-F0D5-4514-3734-5A490511B5AF}"/>
+                <a16:creationId xmlns:a16="http://schemas.microsoft.com/office/drawing/2014/main" id="{3E9FDDFE-6A60-188E-0DB0-271C629C6FD6}"/>
               </a:ext>
             </a:extLst>
           </p:cNvPr>
@@ -5398,7 +5539,7 @@
           </p:cNvPicPr>
           <p:nvPr/>
         </p:nvPicPr>
-        <p:blipFill rotWithShape="1">
+        <p:blipFill>
           <a:blip r:embed="rId2" cstate="print">
             <a:extLst>
               <a:ext uri="{28A0092B-C50C-407E-A947-70E740481C1C}">
@@ -5406,13 +5547,14 @@
               </a:ext>
             </a:extLst>
           </a:blip>
-          <a:srcRect l="25207" t="5923" r="25207" b="5923"/>
-          <a:stretch/>
+          <a:stretch>
+            <a:fillRect/>
+          </a:stretch>
         </p:blipFill>
         <p:spPr>
           <a:xfrm>
-            <a:off x="1261890" y="1044575"/>
-            <a:ext cx="1905000" cy="1905000"/>
+            <a:off x="98640" y="825158"/>
+            <a:ext cx="4438248" cy="2496514"/>
           </a:xfrm>
           <a:prstGeom prst="rect">
             <a:avLst/>
@@ -5545,10 +5687,10 @@
       </p:sp>
       <p:pic>
         <p:nvPicPr>
-          <p:cNvPr id="6" name="Immagine 5" descr="Immagine che contiene linea, Simmetria, origami, design&#10;&#10;Descrizione generata automaticamente">
+          <p:cNvPr id="4" name="Immagine 3" descr="Immagine che contiene linea, design, modello&#10;&#10;Descrizione generata automaticamente">
             <a:extLst>
               <a:ext uri="{FF2B5EF4-FFF2-40B4-BE49-F238E27FC236}">
-                <a16:creationId xmlns:a16="http://schemas.microsoft.com/office/drawing/2014/main" id="{AF90628E-B8CC-54CD-9607-E212879A65C1}"/>
+                <a16:creationId xmlns:a16="http://schemas.microsoft.com/office/drawing/2014/main" id="{71A483B7-89AE-6A74-81D3-E52AE1E90D81}"/>
               </a:ext>
             </a:extLst>
           </p:cNvPr>
@@ -5565,13 +5707,13 @@
               </a:ext>
             </a:extLst>
           </a:blip>
-          <a:srcRect l="25207" t="5923" r="21900" b="5923"/>
+          <a:srcRect l="6547"/>
           <a:stretch/>
         </p:blipFill>
         <p:spPr>
           <a:xfrm>
-            <a:off x="995191" y="892175"/>
-            <a:ext cx="2300460" cy="2156682"/>
+            <a:off x="150920" y="804432"/>
+            <a:ext cx="4308258" cy="2593181"/>
           </a:xfrm>
           <a:prstGeom prst="rect">
             <a:avLst/>
@@ -6036,13 +6178,13 @@
               </a:ext>
             </a:extLst>
           </a:blip>
-          <a:srcRect l="12660" t="27982" r="9549" b="38991"/>
+          <a:srcRect l="1131" t="27982" r="9548" b="38991"/>
           <a:stretch/>
         </p:blipFill>
         <p:spPr>
           <a:xfrm>
-            <a:off x="2587407" y="1539874"/>
-            <a:ext cx="1905001" cy="1143001"/>
+            <a:off x="2305050" y="1539874"/>
+            <a:ext cx="2187359" cy="1143001"/>
           </a:xfrm>
           <a:prstGeom prst="rect">
             <a:avLst/>

</xml_diff>